<commit_message>
SDM2: Finished seminar presentation
</commit_message>
<xml_diff>
--- a/SDM2/manisero/sdm2_Aniserowicz_Michal.pptx
+++ b/SDM2/manisero/sdm2_Aniserowicz_Michal.pptx
@@ -26,8 +26,8 @@
     <p:sldId id="316" r:id="rId17"/>
     <p:sldId id="319" r:id="rId18"/>
     <p:sldId id="320" r:id="rId19"/>
-    <p:sldId id="321" r:id="rId20"/>
-    <p:sldId id="322" r:id="rId21"/>
+    <p:sldId id="322" r:id="rId20"/>
+    <p:sldId id="325" r:id="rId21"/>
     <p:sldId id="323" r:id="rId22"/>
     <p:sldId id="324" r:id="rId23"/>
     <p:sldId id="271" r:id="rId24"/>
@@ -215,7 +215,7 @@
           <a:p>
             <a:fld id="{8B2438A0-9889-4524-A836-B1F16A347C9A}" type="datetimeFigureOut">
               <a:rPr lang="pl-PL" smtClean="0"/>
-              <a:t>2014-04-24</a:t>
+              <a:t>2014-04-25</a:t>
             </a:fld>
             <a:endParaRPr lang="pl-PL"/>
           </a:p>
@@ -761,7 +761,7 @@
           <a:p>
             <a:fld id="{DF8502F3-6FCB-4412-BC1B-6BD1E19AD95B}" type="datetime1">
               <a:rPr lang="pl-PL" smtClean="0"/>
-              <a:t>2014-04-24</a:t>
+              <a:t>2014-04-25</a:t>
             </a:fld>
             <a:endParaRPr lang="pl-PL"/>
           </a:p>
@@ -930,7 +930,7 @@
           <a:p>
             <a:fld id="{2C3A9CA8-94EC-4527-8F8B-DBD707D01242}" type="datetime1">
               <a:rPr lang="pl-PL" smtClean="0"/>
-              <a:t>2014-04-24</a:t>
+              <a:t>2014-04-25</a:t>
             </a:fld>
             <a:endParaRPr lang="pl-PL"/>
           </a:p>
@@ -1109,7 +1109,7 @@
           <a:p>
             <a:fld id="{B6CEB1C5-C0C6-4424-A29E-91E4E3F5914E}" type="datetime1">
               <a:rPr lang="pl-PL" smtClean="0"/>
-              <a:t>2014-04-24</a:t>
+              <a:t>2014-04-25</a:t>
             </a:fld>
             <a:endParaRPr lang="pl-PL"/>
           </a:p>
@@ -1278,7 +1278,7 @@
           <a:p>
             <a:fld id="{72A5EE3F-7E13-4B6A-B05F-2A1CC7201CC3}" type="datetime1">
               <a:rPr lang="pl-PL" smtClean="0"/>
-              <a:t>2014-04-24</a:t>
+              <a:t>2014-04-25</a:t>
             </a:fld>
             <a:endParaRPr lang="pl-PL"/>
           </a:p>
@@ -1523,7 +1523,7 @@
           <a:p>
             <a:fld id="{E9E8B4A4-D862-4963-A883-5BE55689752D}" type="datetime1">
               <a:rPr lang="pl-PL" smtClean="0"/>
-              <a:t>2014-04-24</a:t>
+              <a:t>2014-04-25</a:t>
             </a:fld>
             <a:endParaRPr lang="pl-PL"/>
           </a:p>
@@ -1810,7 +1810,7 @@
           <a:p>
             <a:fld id="{F83EA0BF-0AC4-4E7D-86B2-1B30987E526B}" type="datetime1">
               <a:rPr lang="pl-PL" smtClean="0"/>
-              <a:t>2014-04-24</a:t>
+              <a:t>2014-04-25</a:t>
             </a:fld>
             <a:endParaRPr lang="pl-PL"/>
           </a:p>
@@ -2243,7 +2243,7 @@
           <a:p>
             <a:fld id="{CEDF3D31-0660-41AD-834D-9D9D939F4607}" type="datetime1">
               <a:rPr lang="pl-PL" smtClean="0"/>
-              <a:t>2014-04-24</a:t>
+              <a:t>2014-04-25</a:t>
             </a:fld>
             <a:endParaRPr lang="pl-PL"/>
           </a:p>
@@ -2360,7 +2360,7 @@
           <a:p>
             <a:fld id="{C26B2FC2-C779-4CA5-A028-34554AA059CA}" type="datetime1">
               <a:rPr lang="pl-PL" smtClean="0"/>
-              <a:t>2014-04-24</a:t>
+              <a:t>2014-04-25</a:t>
             </a:fld>
             <a:endParaRPr lang="pl-PL"/>
           </a:p>
@@ -2454,7 +2454,7 @@
           <a:p>
             <a:fld id="{7290F76F-7CB7-4392-91ED-3475F360F105}" type="datetime1">
               <a:rPr lang="pl-PL" smtClean="0"/>
-              <a:t>2014-04-24</a:t>
+              <a:t>2014-04-25</a:t>
             </a:fld>
             <a:endParaRPr lang="pl-PL"/>
           </a:p>
@@ -2647,7 +2647,7 @@
           <a:p>
             <a:fld id="{DBB97A76-55E0-441A-BB3A-40C4EB3C696C}" type="datetime1">
               <a:rPr lang="pl-PL" smtClean="0"/>
-              <a:t>2014-04-24</a:t>
+              <a:t>2014-04-25</a:t>
             </a:fld>
             <a:endParaRPr lang="pl-PL"/>
           </a:p>
@@ -2969,7 +2969,7 @@
           <a:p>
             <a:fld id="{EA6D46FE-61EF-4578-81F4-2582C0B09E9B}" type="datetime1">
               <a:rPr lang="pl-PL" smtClean="0"/>
-              <a:t>2014-04-24</a:t>
+              <a:t>2014-04-25</a:t>
             </a:fld>
             <a:endParaRPr lang="pl-PL"/>
           </a:p>
@@ -3356,7 +3356,7 @@
           <a:p>
             <a:fld id="{52E6C93D-B0D7-4F37-81A4-6580E5D8BBFF}" type="datetime1">
               <a:rPr lang="pl-PL" smtClean="0"/>
-              <a:t>2014-04-24</a:t>
+              <a:t>2014-04-25</a:t>
             </a:fld>
             <a:endParaRPr lang="pl-PL"/>
           </a:p>
@@ -3776,8 +3776,23 @@
                 </a:solidFill>
                 <a:latin typeface="+mj-lt"/>
               </a:rPr>
-              <a:t>Warszawa, 27.11.2013</a:t>
-            </a:r>
+              <a:t>Warszawa, </a:t>
+            </a:r>
+            <a:r>
+              <a:rPr lang="pl-PL" sz="2800" i="1" dirty="0" smtClean="0">
+                <a:solidFill>
+                  <a:schemeClr val="tx2"/>
+                </a:solidFill>
+                <a:latin typeface="+mj-lt"/>
+              </a:rPr>
+              <a:t>25.04.2014</a:t>
+            </a:r>
+            <a:endParaRPr lang="pl-PL" sz="2800" i="1" dirty="0" smtClean="0">
+              <a:solidFill>
+                <a:schemeClr val="tx2"/>
+              </a:solidFill>
+              <a:latin typeface="+mj-lt"/>
+            </a:endParaRPr>
           </a:p>
         </p:txBody>
       </p:sp>
@@ -3916,19 +3931,7 @@
                   </a:outerShdw>
                 </a:effectLst>
               </a:rPr>
-              <a:t>Pozycja telefonu</a:t>
-            </a:r>
-            <a:r>
-              <a:rPr lang="pl-PL" sz="4000" dirty="0" smtClean="0">
-                <a:effectLst>
-                  <a:outerShdw blurRad="38100" dist="38100" dir="2700000" algn="tl">
-                    <a:srgbClr val="000000">
-                      <a:alpha val="43137"/>
-                    </a:srgbClr>
-                  </a:outerShdw>
-                </a:effectLst>
-              </a:rPr>
-              <a:t>: wysokość</a:t>
+              <a:t>Pozycja telefonu: wysokość</a:t>
             </a:r>
             <a:endParaRPr lang="pl-PL" sz="4000" dirty="0">
               <a:effectLst>
@@ -3954,7 +3957,7 @@
         </p:nvSpPr>
         <p:spPr>
           <a:xfrm>
-            <a:off x="457200" y="1124744"/>
+            <a:off x="457200" y="1196752"/>
             <a:ext cx="7620000" cy="5400600"/>
           </a:xfrm>
         </p:spPr>
@@ -3986,7 +3989,6 @@
               <a:rPr lang="pl-PL" dirty="0" smtClean="0"/>
               <a:t>Dokładność odczytu wysokości poprawia barometr zamontowany w niektórych modelach telefonów.</a:t>
             </a:r>
-            <a:endParaRPr lang="pl-PL" dirty="0" smtClean="0"/>
           </a:p>
         </p:txBody>
       </p:sp>
@@ -4374,7 +4376,7 @@
         </p:nvSpPr>
         <p:spPr>
           <a:xfrm>
-            <a:off x="457200" y="1124744"/>
+            <a:off x="457200" y="1196752"/>
             <a:ext cx="7620000" cy="5400600"/>
           </a:xfrm>
         </p:spPr>
@@ -4906,7 +4908,7 @@
         </p:nvSpPr>
         <p:spPr>
           <a:xfrm>
-            <a:off x="457200" y="1124744"/>
+            <a:off x="467544" y="1196752"/>
             <a:ext cx="7620000" cy="5400600"/>
           </a:xfrm>
         </p:spPr>
@@ -5146,7 +5148,7 @@
         </p:nvSpPr>
         <p:spPr>
           <a:xfrm>
-            <a:off x="457200" y="1124744"/>
+            <a:off x="457200" y="1196752"/>
             <a:ext cx="7620000" cy="5400600"/>
           </a:xfrm>
         </p:spPr>
@@ -5210,7 +5212,6 @@
               <a:rPr lang="pl-PL" dirty="0" smtClean="0"/>
               <a:t>być w pełni dokładne.</a:t>
             </a:r>
-            <a:endParaRPr lang="pl-PL" dirty="0" smtClean="0"/>
           </a:p>
         </p:txBody>
       </p:sp>
@@ -5387,7 +5388,7 @@
         </p:nvSpPr>
         <p:spPr>
           <a:xfrm>
-            <a:off x="457200" y="1124744"/>
+            <a:off x="457200" y="1196752"/>
             <a:ext cx="7620000" cy="5400600"/>
           </a:xfrm>
         </p:spPr>
@@ -5941,7 +5942,7 @@
         </p:nvSpPr>
         <p:spPr>
           <a:xfrm>
-            <a:off x="457200" y="1124744"/>
+            <a:off x="457200" y="1196752"/>
             <a:ext cx="7620000" cy="5400600"/>
           </a:xfrm>
         </p:spPr>
@@ -5973,8 +5974,9 @@
             </a:r>
             <a:r>
               <a:rPr lang="pl-PL" dirty="0" smtClean="0"/>
-              <a:t>)</a:t>
-            </a:r>
+              <a:t>).</a:t>
+            </a:r>
+            <a:endParaRPr lang="pl-PL" dirty="0" smtClean="0"/>
           </a:p>
           <a:p>
             <a:r>
@@ -5999,12 +6001,13 @@
             </a:pPr>
             <a:r>
               <a:rPr lang="pl-PL" dirty="0" smtClean="0"/>
-              <a:t>OpenGL ES 2.X.</a:t>
+              <a:t>OpenGL ES 2.X</a:t>
+            </a:r>
+            <a:r>
+              <a:rPr lang="pl-PL" dirty="0" smtClean="0"/>
+              <a:t>.</a:t>
             </a:r>
             <a:endParaRPr lang="pl-PL" dirty="0"/>
-          </a:p>
-          <a:p>
-            <a:endParaRPr lang="pl-PL" dirty="0" smtClean="0"/>
           </a:p>
         </p:txBody>
       </p:sp>
@@ -6181,7 +6184,7 @@
         </p:nvSpPr>
         <p:spPr>
           <a:xfrm>
-            <a:off x="457200" y="1124744"/>
+            <a:off x="467544" y="1196752"/>
             <a:ext cx="7620000" cy="5400600"/>
           </a:xfrm>
         </p:spPr>
@@ -6451,7 +6454,7 @@
         </p:nvSpPr>
         <p:spPr>
           <a:xfrm>
-            <a:off x="457200" y="1124744"/>
+            <a:off x="457200" y="1196752"/>
             <a:ext cx="7620000" cy="5400600"/>
           </a:xfrm>
         </p:spPr>
@@ -6701,7 +6704,19 @@
                   </a:outerShdw>
                 </a:effectLst>
               </a:rPr>
-              <a:t>Definicja modelu</a:t>
+              <a:t>Definicja </a:t>
+            </a:r>
+            <a:r>
+              <a:rPr lang="pl-PL" sz="4000" dirty="0" smtClean="0">
+                <a:effectLst>
+                  <a:outerShdw blurRad="38100" dist="38100" dir="2700000" algn="tl">
+                    <a:srgbClr val="000000">
+                      <a:alpha val="43137"/>
+                    </a:srgbClr>
+                  </a:outerShdw>
+                </a:effectLst>
+              </a:rPr>
+              <a:t>modelu</a:t>
             </a:r>
             <a:endParaRPr lang="pl-PL" sz="4000" dirty="0">
               <a:effectLst>
@@ -6727,7 +6742,7 @@
         </p:nvSpPr>
         <p:spPr>
           <a:xfrm>
-            <a:off x="457200" y="1124744"/>
+            <a:off x="457200" y="1196752"/>
             <a:ext cx="7620000" cy="5400600"/>
           </a:xfrm>
         </p:spPr>
@@ -6738,9 +6753,60 @@
           <a:lstStyle/>
           <a:p>
             <a:r>
+              <a:rPr lang="pl-PL" dirty="0"/>
+              <a:t>Model trójwymiarowy składa się z trójkątnych </a:t>
+            </a:r>
+            <a:r>
               <a:rPr lang="pl-PL" dirty="0" smtClean="0"/>
-              <a:t>sd</a:t>
-            </a:r>
+              <a:t>ścian.</a:t>
+            </a:r>
+          </a:p>
+          <a:p>
+            <a:r>
+              <a:rPr lang="pl-PL" dirty="0" smtClean="0"/>
+              <a:t>Na definicję modelu składają się:</a:t>
+            </a:r>
+          </a:p>
+          <a:p>
+            <a:pPr lvl="1"/>
+            <a:r>
+              <a:rPr lang="pl-PL" dirty="0"/>
+              <a:t>tablica </a:t>
+            </a:r>
+            <a:r>
+              <a:rPr lang="pl-PL" dirty="0" smtClean="0"/>
+              <a:t>współrzędnych </a:t>
+            </a:r>
+            <a:r>
+              <a:rPr lang="pl-PL" dirty="0"/>
+              <a:t>wierzchołków </a:t>
+            </a:r>
+            <a:r>
+              <a:rPr lang="pl-PL" dirty="0" smtClean="0"/>
+              <a:t>obiektu,</a:t>
+            </a:r>
+          </a:p>
+          <a:p>
+            <a:pPr lvl="1"/>
+            <a:r>
+              <a:rPr lang="pl-PL" dirty="0"/>
+              <a:t>tablica kolorów wierzchołków </a:t>
+            </a:r>
+            <a:r>
+              <a:rPr lang="pl-PL" dirty="0" smtClean="0"/>
+              <a:t>obiektu </a:t>
+            </a:r>
+            <a:r>
+              <a:rPr lang="pl-PL" dirty="0"/>
+              <a:t>(r, g, b</a:t>
+            </a:r>
+            <a:r>
+              <a:rPr lang="pl-PL" dirty="0" smtClean="0"/>
+              <a:t>, a).</a:t>
+            </a:r>
+            <a:endParaRPr lang="pl-PL" dirty="0"/>
+          </a:p>
+          <a:p>
             <a:endParaRPr lang="pl-PL" dirty="0" smtClean="0"/>
           </a:p>
         </p:txBody>
@@ -6828,7 +6894,7 @@
     </p:spTree>
     <p:extLst>
       <p:ext uri="{BB962C8B-B14F-4D97-AF65-F5344CB8AC3E}">
-        <p14:creationId xmlns:p14="http://schemas.microsoft.com/office/powerpoint/2010/main" val="2358096671"/>
+        <p14:creationId xmlns:p14="http://schemas.microsoft.com/office/powerpoint/2010/main" val="3718684253"/>
       </p:ext>
     </p:extLst>
   </p:cSld>
@@ -6922,33 +6988,33 @@
               <a:rPr lang="pl-PL" sz="2800" dirty="0" smtClean="0"/>
               <a:t>Opis aplikacji</a:t>
             </a:r>
-            <a:endParaRPr lang="pl-PL" sz="2800" dirty="0" smtClean="0"/>
           </a:p>
           <a:p>
             <a:r>
               <a:rPr lang="pl-PL" sz="2800" dirty="0" smtClean="0"/>
               <a:t>Odczytywanie pozycji telefonu</a:t>
             </a:r>
-            <a:endParaRPr lang="pl-PL" sz="2800" dirty="0" smtClean="0"/>
           </a:p>
           <a:p>
             <a:r>
               <a:rPr lang="pl-PL" sz="2800" dirty="0" smtClean="0"/>
               <a:t>Odczytywanie orientacji telefonu</a:t>
             </a:r>
-            <a:endParaRPr lang="pl-PL" sz="2800" dirty="0" smtClean="0"/>
           </a:p>
           <a:p>
             <a:r>
               <a:rPr lang="pl-PL" sz="2800" dirty="0" smtClean="0"/>
               <a:t>Rozpoznawanie obrazu</a:t>
             </a:r>
-            <a:endParaRPr lang="pl-PL" sz="2800" dirty="0" smtClean="0"/>
           </a:p>
           <a:p>
             <a:r>
               <a:rPr lang="pl-PL" sz="2800" dirty="0" smtClean="0"/>
-              <a:t>Wyświetlenie obrazu</a:t>
+              <a:t>Wyświetlanie </a:t>
+            </a:r>
+            <a:r>
+              <a:rPr lang="pl-PL" sz="2800" dirty="0" smtClean="0"/>
+              <a:t>obrazu</a:t>
             </a:r>
           </a:p>
           <a:p>
@@ -6956,7 +7022,6 @@
               <a:rPr lang="pl-PL" sz="2800" dirty="0" smtClean="0"/>
               <a:t>Podsumowanie</a:t>
             </a:r>
-            <a:endParaRPr lang="pl-PL" sz="2800" dirty="0" smtClean="0"/>
           </a:p>
         </p:txBody>
       </p:sp>
@@ -7112,7 +7177,7 @@
         </p:nvSpPr>
         <p:spPr>
           <a:xfrm>
-            <a:off x="457200" y="1124744"/>
+            <a:off x="457200" y="1196752"/>
             <a:ext cx="7620000" cy="5400600"/>
           </a:xfrm>
         </p:spPr>
@@ -7124,7 +7189,35 @@
           <a:p>
             <a:r>
               <a:rPr lang="pl-PL" dirty="0" smtClean="0"/>
-              <a:t>sd</a:t>
+              <a:t>Przed wyświetleniem modelu, należy obrócić go odpowiednio do orientacji telefonu i położenia tła.</a:t>
+            </a:r>
+          </a:p>
+          <a:p>
+            <a:r>
+              <a:rPr lang="pl-PL" dirty="0" smtClean="0"/>
+              <a:t>Znając orientację telefonu, można użyć API systemu (</a:t>
+            </a:r>
+            <a:r>
+              <a:rPr lang="pl-PL" dirty="0" smtClean="0">
+                <a:effectLst>
+                  <a:outerShdw blurRad="38100" dist="38100" dir="2700000" algn="tl">
+                    <a:srgbClr val="000000">
+                      <a:alpha val="43137"/>
+                    </a:srgbClr>
+                  </a:outerShdw>
+                </a:effectLst>
+              </a:rPr>
+              <a:t>SensorManager.getRotationMatrix()</a:t>
+            </a:r>
+            <a:r>
+              <a:rPr lang="pl-PL" dirty="0" smtClean="0"/>
+              <a:t>) do konwersji współrzędnych z układu współrzędnych telefonu do układu współrzędnych otoczenia i uzyskania odpowiedniej macierzy obrotów modelu.</a:t>
+            </a:r>
+          </a:p>
+          <a:p>
+            <a:r>
+              <a:rPr lang="pl-PL" dirty="0" smtClean="0"/>
+              <a:t>Uzyskaną macierz należy przekazać bibliotece OpenGL przed każdorazowym odświeżeniem ekranu.</a:t>
             </a:r>
             <a:endParaRPr lang="pl-PL" dirty="0" smtClean="0"/>
           </a:p>
@@ -7213,7 +7306,7 @@
     </p:spTree>
     <p:extLst>
       <p:ext uri="{BB962C8B-B14F-4D97-AF65-F5344CB8AC3E}">
-        <p14:creationId xmlns:p14="http://schemas.microsoft.com/office/powerpoint/2010/main" val="3718684253"/>
+        <p14:creationId xmlns:p14="http://schemas.microsoft.com/office/powerpoint/2010/main" val="2941945665"/>
       </p:ext>
     </p:extLst>
   </p:cSld>
@@ -7303,7 +7396,7 @@
         </p:nvSpPr>
         <p:spPr>
           <a:xfrm>
-            <a:off x="457200" y="1124744"/>
+            <a:off x="457200" y="1196752"/>
             <a:ext cx="7620000" cy="5400600"/>
           </a:xfrm>
         </p:spPr>
@@ -7315,7 +7408,146 @@
           <a:p>
             <a:r>
               <a:rPr lang="pl-PL" dirty="0" smtClean="0"/>
-              <a:t>sd</a:t>
+              <a:t>Wyświetlając model, należy także uwzględnić aktualnie stosowany przez telefon tryb wyświetlania obrazu.</a:t>
+            </a:r>
+          </a:p>
+          <a:p>
+            <a:r>
+              <a:rPr lang="pl-PL" dirty="0" smtClean="0"/>
+              <a:t>Podstawowe tryby wyświetlania:</a:t>
+            </a:r>
+          </a:p>
+          <a:p>
+            <a:pPr lvl="1"/>
+            <a:r>
+              <a:rPr lang="pl-PL" dirty="0" smtClean="0"/>
+              <a:t>Portait mode (</a:t>
+            </a:r>
+            <a:r>
+              <a:rPr lang="pl-PL" dirty="0"/>
+              <a:t>domyślny) - </a:t>
+            </a:r>
+            <a:r>
+              <a:rPr lang="pl-PL" dirty="0" smtClean="0"/>
+              <a:t>używany</a:t>
+            </a:r>
+            <a:r>
+              <a:rPr lang="pl-PL" dirty="0"/>
+              <a:t>, gdy telefon znajduje </a:t>
+            </a:r>
+            <a:r>
+              <a:rPr lang="pl-PL" dirty="0" smtClean="0"/>
+              <a:t>się w pozycji </a:t>
+            </a:r>
+            <a:r>
+              <a:rPr lang="pl-PL" dirty="0"/>
+              <a:t>pionowej</a:t>
+            </a:r>
+            <a:endParaRPr lang="pl-PL" dirty="0" smtClean="0"/>
+          </a:p>
+          <a:p>
+            <a:pPr lvl="1"/>
+            <a:r>
+              <a:rPr lang="pl-PL" dirty="0"/>
+              <a:t>Landscape mode </a:t>
+            </a:r>
+            <a:r>
+              <a:rPr lang="pl-PL" dirty="0" smtClean="0"/>
+              <a:t>- używany </a:t>
+            </a:r>
+            <a:r>
+              <a:rPr lang="pl-PL" dirty="0"/>
+              <a:t>w pozycji </a:t>
+            </a:r>
+            <a:r>
+              <a:rPr lang="pl-PL" dirty="0" smtClean="0"/>
+              <a:t>poziomej.</a:t>
+            </a:r>
+          </a:p>
+          <a:p>
+            <a:r>
+              <a:rPr lang="pl-PL" dirty="0" smtClean="0"/>
+              <a:t>Aktualny tryb wyświetlania można uzyskać wywołując metodę </a:t>
+            </a:r>
+            <a:r>
+              <a:rPr lang="pl-PL" dirty="0" smtClean="0">
+                <a:effectLst>
+                  <a:outerShdw blurRad="38100" dist="38100" dir="2700000" algn="tl">
+                    <a:srgbClr val="000000">
+                      <a:alpha val="43137"/>
+                    </a:srgbClr>
+                  </a:outerShdw>
+                </a:effectLst>
+              </a:rPr>
+              <a:t>getRotation()</a:t>
+            </a:r>
+            <a:r>
+              <a:rPr lang="pl-PL" dirty="0" smtClean="0"/>
+              <a:t> klasy </a:t>
+            </a:r>
+            <a:r>
+              <a:rPr lang="pl-PL" dirty="0" smtClean="0">
+                <a:effectLst>
+                  <a:outerShdw blurRad="38100" dist="38100" dir="2700000" algn="tl">
+                    <a:srgbClr val="000000">
+                      <a:alpha val="43137"/>
+                    </a:srgbClr>
+                  </a:outerShdw>
+                </a:effectLst>
+              </a:rPr>
+              <a:t>Display</a:t>
+            </a:r>
+            <a:r>
+              <a:rPr lang="pl-PL" dirty="0" smtClean="0"/>
+              <a:t>.</a:t>
+            </a:r>
+          </a:p>
+          <a:p>
+            <a:r>
+              <a:rPr lang="pl-PL" dirty="0" smtClean="0"/>
+              <a:t>Dla trybu innego niż Portrait, macierz obrotów modelu należy skorygować, zamieniając miejscami dwie osie.</a:t>
+            </a:r>
+          </a:p>
+          <a:p>
+            <a:r>
+              <a:rPr lang="pl-PL" dirty="0" smtClean="0"/>
+              <a:t>W celu k</a:t>
+            </a:r>
+            <a:r>
+              <a:rPr lang="pl-PL" dirty="0"/>
+              <a:t>orekcji macierzy, należy użyć metody </a:t>
+            </a:r>
+            <a:r>
+              <a:rPr lang="pl-PL" dirty="0" smtClean="0">
+                <a:effectLst>
+                  <a:outerShdw blurRad="38100" dist="38100" dir="2700000" algn="tl">
+                    <a:srgbClr val="000000">
+                      <a:alpha val="43137"/>
+                    </a:srgbClr>
+                  </a:outerShdw>
+                </a:effectLst>
+              </a:rPr>
+              <a:t>remapCoordinateSystem()</a:t>
+            </a:r>
+            <a:r>
+              <a:rPr lang="pl-PL" dirty="0" smtClean="0"/>
+              <a:t> klasy </a:t>
+            </a:r>
+            <a:r>
+              <a:rPr lang="pl-PL" dirty="0" smtClean="0">
+                <a:effectLst>
+                  <a:outerShdw blurRad="38100" dist="38100" dir="2700000" algn="tl">
+                    <a:srgbClr val="000000">
+                      <a:alpha val="43137"/>
+                    </a:srgbClr>
+                  </a:outerShdw>
+                </a:effectLst>
+              </a:rPr>
+              <a:t>SensorManager</a:t>
+            </a:r>
+            <a:r>
+              <a:rPr lang="pl-PL" dirty="0" smtClean="0"/>
+              <a:t>.</a:t>
             </a:r>
             <a:endParaRPr lang="pl-PL" dirty="0" smtClean="0"/>
           </a:p>
@@ -7468,7 +7700,7 @@
                   </a:outerShdw>
                 </a:effectLst>
               </a:rPr>
-              <a:t>Przykład</a:t>
+              <a:t>Przykłady obrotów</a:t>
             </a:r>
             <a:endParaRPr lang="pl-PL" sz="4000" dirty="0">
               <a:effectLst>
@@ -8664,7 +8896,7 @@
         </p:nvSpPr>
         <p:spPr>
           <a:xfrm>
-            <a:off x="457200" y="1124744"/>
+            <a:off x="457200" y="1196752"/>
             <a:ext cx="7620000" cy="4680520"/>
           </a:xfrm>
         </p:spPr>
@@ -8676,20 +8908,42 @@
           <a:p>
             <a:r>
               <a:rPr lang="pl-PL" sz="2400" dirty="0" smtClean="0"/>
-              <a:t>Wykrywanie krawędzi (a także wiele innych operacji) sprowadza się do zastosowania dyskretnego splotu macierzy</a:t>
+              <a:t>Realizacja koncepcji rzeczywistości rozszerzonej wymaga wykorzystania wielu sensorów zamontowanych w telefonie (GPS, żyroskop, akcelerometr, magnetometr, kamera).</a:t>
             </a:r>
           </a:p>
           <a:p>
             <a:r>
               <a:rPr lang="pl-PL" sz="2400" dirty="0" smtClean="0"/>
-              <a:t>Algorytmy zaproponowane w latach 60., czy 80. są nadal stosowane</a:t>
-            </a:r>
+              <a:t>Główne problemy tego typu aplikacji to niedokładność odczytów sensorów i ich zapotrzebowanie na energię.</a:t>
+            </a:r>
+          </a:p>
+          <a:p>
+            <a:endParaRPr lang="pl-PL" sz="2400" dirty="0" smtClean="0"/>
           </a:p>
           <a:p>
             <a:r>
               <a:rPr lang="pl-PL" sz="2400" dirty="0" smtClean="0"/>
-              <a:t>Operator Sobela i algorytm Canny’ego to obecnie najpopularniejsze metody wykrywania krawędzi</a:t>
-            </a:r>
+              <a:t>Klasa </a:t>
+            </a:r>
+            <a:r>
+              <a:rPr lang="pl-PL" sz="2400" dirty="0" smtClean="0">
+                <a:effectLst>
+                  <a:outerShdw blurRad="38100" dist="38100" dir="2700000" algn="tl">
+                    <a:srgbClr val="000000">
+                      <a:alpha val="43137"/>
+                    </a:srgbClr>
+                  </a:outerShdw>
+                </a:effectLst>
+              </a:rPr>
+              <a:t>SensorManager</a:t>
+            </a:r>
+            <a:r>
+              <a:rPr lang="pl-PL" sz="2400" dirty="0" smtClean="0"/>
+              <a:t> ma ewidentnie zbyt wiele odpowiedzialności.</a:t>
+            </a:r>
+            <a:endParaRPr lang="pl-PL" sz="2400" dirty="0" smtClean="0"/>
+          </a:p>
+          <a:p>
             <a:endParaRPr lang="pl-PL" sz="2400" dirty="0"/>
           </a:p>
         </p:txBody>
@@ -8935,7 +9189,7 @@
         </p:nvSpPr>
         <p:spPr>
           <a:xfrm>
-            <a:off x="457200" y="1124744"/>
+            <a:off x="457200" y="1196752"/>
             <a:ext cx="7620000" cy="5400600"/>
           </a:xfrm>
         </p:spPr>
@@ -8947,7 +9201,11 @@
           <a:p>
             <a:r>
               <a:rPr lang="pl-PL" sz="2400" dirty="0" smtClean="0"/>
-              <a:t>Aplikacja pozwala na wybranie i zapamiętanie tła, na którym wyświetlana będzie zdefiniowana przez użytkownika grafika.</a:t>
+              <a:t>Aplikacja realizująca koncepcję rzeczywistości rozszerzonej, pozwalająca </a:t>
+            </a:r>
+            <a:r>
+              <a:rPr lang="pl-PL" sz="2400" dirty="0" smtClean="0"/>
+              <a:t>na wybranie i zapamiętanie tła, na którym wyświetlana będzie zdefiniowana przez użytkownika grafika.</a:t>
             </a:r>
           </a:p>
           <a:p>
@@ -8965,7 +9223,20 @@
           <a:p>
             <a:r>
               <a:rPr lang="pl-PL" sz="2400" dirty="0" smtClean="0"/>
-              <a:t>Platforma: Android.</a:t>
+              <a:t>Platforma: Android</a:t>
+            </a:r>
+            <a:r>
+              <a:rPr lang="pl-PL" sz="2400" dirty="0" smtClean="0"/>
+              <a:t>.</a:t>
+            </a:r>
+          </a:p>
+          <a:p>
+            <a:endParaRPr lang="pl-PL" sz="2400" dirty="0"/>
+          </a:p>
+          <a:p>
+            <a:r>
+              <a:rPr lang="pl-PL" sz="2400" dirty="0" smtClean="0"/>
+              <a:t>Promotor: dr inż. Jakub Koperwas.</a:t>
             </a:r>
             <a:endParaRPr lang="pl-PL" sz="2400" dirty="0" smtClean="0"/>
           </a:p>
@@ -9144,7 +9415,7 @@
         </p:nvSpPr>
         <p:spPr>
           <a:xfrm>
-            <a:off x="457200" y="1124744"/>
+            <a:off x="457200" y="1196752"/>
             <a:ext cx="7620000" cy="5400600"/>
           </a:xfrm>
         </p:spPr>
@@ -9188,7 +9459,11 @@
             </a:pPr>
             <a:r>
               <a:rPr lang="pl-PL" sz="2400" dirty="0" smtClean="0"/>
-              <a:t>Rozpoznianie tła</a:t>
+              <a:t>Rozpoznanie </a:t>
+            </a:r>
+            <a:r>
+              <a:rPr lang="pl-PL" sz="2400" dirty="0" smtClean="0"/>
+              <a:t>tła</a:t>
             </a:r>
           </a:p>
           <a:p>
@@ -9201,7 +9476,6 @@
               <a:rPr lang="pl-PL" dirty="0" smtClean="0"/>
               <a:t>względnienie informacji o orientacji telefonu.</a:t>
             </a:r>
-            <a:endParaRPr lang="pl-PL" dirty="0" smtClean="0"/>
           </a:p>
           <a:p>
             <a:pPr marL="571500" indent="-457200">
@@ -9407,7 +9681,7 @@
         </p:nvSpPr>
         <p:spPr>
           <a:xfrm>
-            <a:off x="457200" y="1124744"/>
+            <a:off x="467544" y="1196752"/>
             <a:ext cx="7620000" cy="5400600"/>
           </a:xfrm>
         </p:spPr>
@@ -9432,15 +9706,31 @@
           <a:p>
             <a:pPr lvl="1"/>
             <a:r>
+              <a:rPr lang="pl-PL" dirty="0"/>
+              <a:t>w</a:t>
+            </a:r>
+            <a:r>
               <a:rPr lang="pl-PL" dirty="0" smtClean="0"/>
-              <a:t>Wspomagany GPS,</a:t>
+              <a:t>spomagany </a:t>
+            </a:r>
+            <a:r>
+              <a:rPr lang="pl-PL" dirty="0" smtClean="0"/>
+              <a:t>GPS,</a:t>
             </a:r>
           </a:p>
           <a:p>
             <a:pPr lvl="1"/>
             <a:r>
+              <a:rPr lang="pl-PL" dirty="0"/>
+              <a:t>o</a:t>
+            </a:r>
+            <a:r>
               <a:rPr lang="pl-PL" dirty="0" smtClean="0"/>
-              <a:t>Odczyt pasywny.</a:t>
+              <a:t>dczyt </a:t>
+            </a:r>
+            <a:r>
+              <a:rPr lang="pl-PL" dirty="0" smtClean="0"/>
+              <a:t>pasywny.</a:t>
             </a:r>
           </a:p>
           <a:p>
@@ -9679,19 +9969,7 @@
                   </a:outerShdw>
                 </a:effectLst>
               </a:rPr>
-              <a:t>Pozycja telefonu</a:t>
-            </a:r>
-            <a:r>
-              <a:rPr lang="pl-PL" sz="4000" dirty="0" smtClean="0">
-                <a:effectLst>
-                  <a:outerShdw blurRad="38100" dist="38100" dir="2700000" algn="tl">
-                    <a:srgbClr val="000000">
-                      <a:alpha val="43137"/>
-                    </a:srgbClr>
-                  </a:outerShdw>
-                </a:effectLst>
-              </a:rPr>
-              <a:t>: GPS</a:t>
+              <a:t>Pozycja telefonu: GPS</a:t>
             </a:r>
             <a:endParaRPr lang="pl-PL" sz="4000" dirty="0">
               <a:effectLst>
@@ -9717,7 +9995,7 @@
         </p:nvSpPr>
         <p:spPr>
           <a:xfrm>
-            <a:off x="457200" y="1124744"/>
+            <a:off x="467544" y="1196752"/>
             <a:ext cx="7620000" cy="5400600"/>
           </a:xfrm>
         </p:spPr>
@@ -9849,7 +10127,6 @@
               <a:rPr lang="pl-PL" dirty="0" smtClean="0"/>
               <a:t>zródeł.</a:t>
             </a:r>
-            <a:endParaRPr lang="pl-PL" dirty="0" smtClean="0"/>
           </a:p>
         </p:txBody>
       </p:sp>
@@ -10000,7 +10277,7 @@
                   </a:outerShdw>
                 </a:effectLst>
               </a:rPr>
-              <a:t>Pozycja telefonu</a:t>
+              <a:t>Pozycja telefonu: </a:t>
             </a:r>
             <a:r>
               <a:rPr lang="pl-PL" sz="4000" dirty="0" smtClean="0">
@@ -10012,7 +10289,19 @@
                   </a:outerShdw>
                 </a:effectLst>
               </a:rPr>
-              <a:t>: Assisted GPS</a:t>
+              <a:t>wspomagany </a:t>
+            </a:r>
+            <a:r>
+              <a:rPr lang="pl-PL" sz="4000" dirty="0" smtClean="0">
+                <a:effectLst>
+                  <a:outerShdw blurRad="38100" dist="38100" dir="2700000" algn="tl">
+                    <a:srgbClr val="000000">
+                      <a:alpha val="43137"/>
+                    </a:srgbClr>
+                  </a:outerShdw>
+                </a:effectLst>
+              </a:rPr>
+              <a:t>GPS</a:t>
             </a:r>
             <a:endParaRPr lang="pl-PL" sz="4000" dirty="0">
               <a:effectLst>
@@ -10038,7 +10327,7 @@
         </p:nvSpPr>
         <p:spPr>
           <a:xfrm>
-            <a:off x="457200" y="1124744"/>
+            <a:off x="457200" y="1196752"/>
             <a:ext cx="7620000" cy="5400600"/>
           </a:xfrm>
         </p:spPr>
@@ -10098,7 +10387,11 @@
             <a:pPr lvl="1"/>
             <a:r>
               <a:rPr lang="pl-PL" dirty="0" smtClean="0"/>
-              <a:t>znaczące przyśpieszenie uzyskania </a:t>
+              <a:t>znaczne </a:t>
+            </a:r>
+            <a:r>
+              <a:rPr lang="pl-PL" dirty="0" smtClean="0"/>
+              <a:t>przyśpieszenie uzyskania </a:t>
             </a:r>
             <a:r>
               <a:rPr lang="pl-PL" dirty="0"/>
@@ -10137,8 +10430,21 @@
           <a:p>
             <a:r>
               <a:rPr lang="pl-PL" sz="2400" dirty="0" smtClean="0"/>
-              <a:t>Pobiera mniej energii, niż „czysty” GPS</a:t>
-            </a:r>
+              <a:t>Pobiera mniej </a:t>
+            </a:r>
+            <a:r>
+              <a:rPr lang="pl-PL" sz="2400" dirty="0" smtClean="0"/>
+              <a:t>energii </a:t>
+            </a:r>
+            <a:r>
+              <a:rPr lang="pl-PL" sz="2400" dirty="0" smtClean="0"/>
+              <a:t>niż „czysty” </a:t>
+            </a:r>
+            <a:r>
+              <a:rPr lang="pl-PL" sz="2400" dirty="0" smtClean="0"/>
+              <a:t>GPS.</a:t>
+            </a:r>
+            <a:endParaRPr lang="pl-PL" sz="2400" dirty="0" smtClean="0"/>
           </a:p>
         </p:txBody>
       </p:sp>
@@ -10289,19 +10595,7 @@
                   </a:outerShdw>
                 </a:effectLst>
               </a:rPr>
-              <a:t>Pozycja telefonu</a:t>
-            </a:r>
-            <a:r>
-              <a:rPr lang="pl-PL" sz="4000" dirty="0" smtClean="0">
-                <a:effectLst>
-                  <a:outerShdw blurRad="38100" dist="38100" dir="2700000" algn="tl">
-                    <a:srgbClr val="000000">
-                      <a:alpha val="43137"/>
-                    </a:srgbClr>
-                  </a:outerShdw>
-                </a:effectLst>
-              </a:rPr>
-              <a:t>: odcztyt pasywny</a:t>
+              <a:t>Pozycja telefonu: odcztyt pasywny</a:t>
             </a:r>
             <a:endParaRPr lang="pl-PL" sz="4000" dirty="0">
               <a:effectLst>
@@ -10327,7 +10621,7 @@
         </p:nvSpPr>
         <p:spPr>
           <a:xfrm>
-            <a:off x="457200" y="1124744"/>
+            <a:off x="457200" y="1196752"/>
             <a:ext cx="7620000" cy="5400600"/>
           </a:xfrm>
         </p:spPr>
@@ -10552,19 +10846,7 @@
                   </a:outerShdw>
                 </a:effectLst>
               </a:rPr>
-              <a:t>Pozycja telefonu</a:t>
-            </a:r>
-            <a:r>
-              <a:rPr lang="pl-PL" sz="4000" dirty="0" smtClean="0">
-                <a:effectLst>
-                  <a:outerShdw blurRad="38100" dist="38100" dir="2700000" algn="tl">
-                    <a:srgbClr val="000000">
-                      <a:alpha val="43137"/>
-                    </a:srgbClr>
-                  </a:outerShdw>
-                </a:effectLst>
-              </a:rPr>
-              <a:t>: znaczenie błędu</a:t>
+              <a:t>Pozycja telefonu: znaczenie błędu</a:t>
             </a:r>
             <a:endParaRPr lang="pl-PL" sz="4000" dirty="0">
               <a:effectLst>
@@ -11025,7 +11307,6 @@
               <a:rPr lang="pl-PL" sz="2400" dirty="0" smtClean="0"/>
               <a:t>A, B – rzeczywiste położenia telefonów.</a:t>
             </a:r>
-            <a:endParaRPr lang="pl-PL" sz="2400" dirty="0" smtClean="0"/>
           </a:p>
           <a:p>
             <a:r>
@@ -11038,7 +11319,6 @@
               <a:rPr lang="pl-PL" sz="2400" dirty="0" smtClean="0"/>
               <a:t>Błąd: ok. 10 m.</a:t>
             </a:r>
-            <a:endParaRPr lang="pl-PL" sz="2400" dirty="0" smtClean="0"/>
           </a:p>
         </p:txBody>
       </p:sp>

</xml_diff>

<commit_message>
Changed SDM2 presentation title
</commit_message>
<xml_diff>
--- a/SDM2/manisero/sdm2_Aniserowicz_Michal.pptx
+++ b/SDM2/manisero/sdm2_Aniserowicz_Michal.pptx
@@ -215,7 +215,7 @@
           <a:p>
             <a:fld id="{8B2438A0-9889-4524-A836-B1F16A347C9A}" type="datetimeFigureOut">
               <a:rPr lang="pl-PL" smtClean="0"/>
-              <a:t>2014-04-25</a:t>
+              <a:t>2014-05-19</a:t>
             </a:fld>
             <a:endParaRPr lang="pl-PL"/>
           </a:p>
@@ -761,7 +761,7 @@
           <a:p>
             <a:fld id="{DF8502F3-6FCB-4412-BC1B-6BD1E19AD95B}" type="datetime1">
               <a:rPr lang="pl-PL" smtClean="0"/>
-              <a:t>2014-04-25</a:t>
+              <a:t>2014-05-19</a:t>
             </a:fld>
             <a:endParaRPr lang="pl-PL"/>
           </a:p>
@@ -930,7 +930,7 @@
           <a:p>
             <a:fld id="{2C3A9CA8-94EC-4527-8F8B-DBD707D01242}" type="datetime1">
               <a:rPr lang="pl-PL" smtClean="0"/>
-              <a:t>2014-04-25</a:t>
+              <a:t>2014-05-19</a:t>
             </a:fld>
             <a:endParaRPr lang="pl-PL"/>
           </a:p>
@@ -1109,7 +1109,7 @@
           <a:p>
             <a:fld id="{B6CEB1C5-C0C6-4424-A29E-91E4E3F5914E}" type="datetime1">
               <a:rPr lang="pl-PL" smtClean="0"/>
-              <a:t>2014-04-25</a:t>
+              <a:t>2014-05-19</a:t>
             </a:fld>
             <a:endParaRPr lang="pl-PL"/>
           </a:p>
@@ -1278,7 +1278,7 @@
           <a:p>
             <a:fld id="{72A5EE3F-7E13-4B6A-B05F-2A1CC7201CC3}" type="datetime1">
               <a:rPr lang="pl-PL" smtClean="0"/>
-              <a:t>2014-04-25</a:t>
+              <a:t>2014-05-19</a:t>
             </a:fld>
             <a:endParaRPr lang="pl-PL"/>
           </a:p>
@@ -1523,7 +1523,7 @@
           <a:p>
             <a:fld id="{E9E8B4A4-D862-4963-A883-5BE55689752D}" type="datetime1">
               <a:rPr lang="pl-PL" smtClean="0"/>
-              <a:t>2014-04-25</a:t>
+              <a:t>2014-05-19</a:t>
             </a:fld>
             <a:endParaRPr lang="pl-PL"/>
           </a:p>
@@ -1810,7 +1810,7 @@
           <a:p>
             <a:fld id="{F83EA0BF-0AC4-4E7D-86B2-1B30987E526B}" type="datetime1">
               <a:rPr lang="pl-PL" smtClean="0"/>
-              <a:t>2014-04-25</a:t>
+              <a:t>2014-05-19</a:t>
             </a:fld>
             <a:endParaRPr lang="pl-PL"/>
           </a:p>
@@ -2243,7 +2243,7 @@
           <a:p>
             <a:fld id="{CEDF3D31-0660-41AD-834D-9D9D939F4607}" type="datetime1">
               <a:rPr lang="pl-PL" smtClean="0"/>
-              <a:t>2014-04-25</a:t>
+              <a:t>2014-05-19</a:t>
             </a:fld>
             <a:endParaRPr lang="pl-PL"/>
           </a:p>
@@ -2360,7 +2360,7 @@
           <a:p>
             <a:fld id="{C26B2FC2-C779-4CA5-A028-34554AA059CA}" type="datetime1">
               <a:rPr lang="pl-PL" smtClean="0"/>
-              <a:t>2014-04-25</a:t>
+              <a:t>2014-05-19</a:t>
             </a:fld>
             <a:endParaRPr lang="pl-PL"/>
           </a:p>
@@ -2454,7 +2454,7 @@
           <a:p>
             <a:fld id="{7290F76F-7CB7-4392-91ED-3475F360F105}" type="datetime1">
               <a:rPr lang="pl-PL" smtClean="0"/>
-              <a:t>2014-04-25</a:t>
+              <a:t>2014-05-19</a:t>
             </a:fld>
             <a:endParaRPr lang="pl-PL"/>
           </a:p>
@@ -2647,7 +2647,7 @@
           <a:p>
             <a:fld id="{DBB97A76-55E0-441A-BB3A-40C4EB3C696C}" type="datetime1">
               <a:rPr lang="pl-PL" smtClean="0"/>
-              <a:t>2014-04-25</a:t>
+              <a:t>2014-05-19</a:t>
             </a:fld>
             <a:endParaRPr lang="pl-PL"/>
           </a:p>
@@ -2969,7 +2969,7 @@
           <a:p>
             <a:fld id="{EA6D46FE-61EF-4578-81F4-2582C0B09E9B}" type="datetime1">
               <a:rPr lang="pl-PL" smtClean="0"/>
-              <a:t>2014-04-25</a:t>
+              <a:t>2014-05-19</a:t>
             </a:fld>
             <a:endParaRPr lang="pl-PL"/>
           </a:p>
@@ -3356,7 +3356,7 @@
           <a:p>
             <a:fld id="{52E6C93D-B0D7-4F37-81A4-6580E5D8BBFF}" type="datetime1">
               <a:rPr lang="pl-PL" smtClean="0"/>
-              <a:t>2014-04-25</a:t>
+              <a:t>2014-05-19</a:t>
             </a:fld>
             <a:endParaRPr lang="pl-PL"/>
           </a:p>
@@ -3701,6 +3701,18 @@
           <a:lstStyle/>
           <a:p>
             <a:r>
+              <a:rPr lang="pl-PL" sz="3600" smtClean="0">
+                <a:effectLst>
+                  <a:outerShdw blurRad="38100" dist="38100" dir="2700000" algn="tl">
+                    <a:srgbClr val="000000">
+                      <a:alpha val="43137"/>
+                    </a:srgbClr>
+                  </a:outerShdw>
+                </a:effectLst>
+              </a:rPr>
+              <a:t>Aplikacja mobilna umożliwiająca </a:t>
+            </a:r>
+            <a:r>
               <a:rPr lang="pl-PL" sz="3600" dirty="0">
                 <a:effectLst>
                   <a:outerShdw blurRad="38100" dist="38100" dir="2700000" algn="tl">
@@ -3710,7 +3722,7 @@
                   </a:outerShdw>
                 </a:effectLst>
               </a:rPr>
-              <a:t>Projekt aplikacji mobilnej umożliwiającej umieszczenie wirtualnej grafiki w rzeczywistym </a:t>
+              <a:t>umieszczenie wirtualnej grafiki w rzeczywistym </a:t>
             </a:r>
             <a:r>
               <a:rPr lang="pl-PL" sz="3600" dirty="0" smtClean="0">
@@ -3776,23 +3788,8 @@
                 </a:solidFill>
                 <a:latin typeface="+mj-lt"/>
               </a:rPr>
-              <a:t>Warszawa, </a:t>
-            </a:r>
-            <a:r>
-              <a:rPr lang="pl-PL" sz="2800" i="1" dirty="0" smtClean="0">
-                <a:solidFill>
-                  <a:schemeClr val="tx2"/>
-                </a:solidFill>
-                <a:latin typeface="+mj-lt"/>
-              </a:rPr>
-              <a:t>25.04.2014</a:t>
-            </a:r>
-            <a:endParaRPr lang="pl-PL" sz="2800" i="1" dirty="0" smtClean="0">
-              <a:solidFill>
-                <a:schemeClr val="tx2"/>
-              </a:solidFill>
-              <a:latin typeface="+mj-lt"/>
-            </a:endParaRPr>
+              <a:t>Warszawa, 25.04.2014</a:t>
+            </a:r>
           </a:p>
         </p:txBody>
       </p:sp>
@@ -5976,7 +5973,6 @@
               <a:rPr lang="pl-PL" dirty="0" smtClean="0"/>
               <a:t>).</a:t>
             </a:r>
-            <a:endParaRPr lang="pl-PL" dirty="0" smtClean="0"/>
           </a:p>
           <a:p>
             <a:r>
@@ -6001,11 +5997,7 @@
             </a:pPr>
             <a:r>
               <a:rPr lang="pl-PL" dirty="0" smtClean="0"/>
-              <a:t>OpenGL ES 2.X</a:t>
-            </a:r>
-            <a:r>
-              <a:rPr lang="pl-PL" dirty="0" smtClean="0"/>
-              <a:t>.</a:t>
+              <a:t>OpenGL ES 2.X.</a:t>
             </a:r>
             <a:endParaRPr lang="pl-PL" dirty="0"/>
           </a:p>
@@ -6704,19 +6696,7 @@
                   </a:outerShdw>
                 </a:effectLst>
               </a:rPr>
-              <a:t>Definicja </a:t>
-            </a:r>
-            <a:r>
-              <a:rPr lang="pl-PL" sz="4000" dirty="0" smtClean="0">
-                <a:effectLst>
-                  <a:outerShdw blurRad="38100" dist="38100" dir="2700000" algn="tl">
-                    <a:srgbClr val="000000">
-                      <a:alpha val="43137"/>
-                    </a:srgbClr>
-                  </a:outerShdw>
-                </a:effectLst>
-              </a:rPr>
-              <a:t>modelu</a:t>
+              <a:t>Definicja modelu</a:t>
             </a:r>
             <a:endParaRPr lang="pl-PL" sz="4000" dirty="0">
               <a:effectLst>
@@ -7010,11 +6990,7 @@
           <a:p>
             <a:r>
               <a:rPr lang="pl-PL" sz="2800" dirty="0" smtClean="0"/>
-              <a:t>Wyświetlanie </a:t>
-            </a:r>
-            <a:r>
-              <a:rPr lang="pl-PL" sz="2800" dirty="0" smtClean="0"/>
-              <a:t>obrazu</a:t>
+              <a:t>Wyświetlanie obrazu</a:t>
             </a:r>
           </a:p>
           <a:p>
@@ -7219,7 +7195,6 @@
               <a:rPr lang="pl-PL" dirty="0" smtClean="0"/>
               <a:t>Uzyskaną macierz należy przekazać bibliotece OpenGL przed każdorazowym odświeżeniem ekranu.</a:t>
             </a:r>
-            <a:endParaRPr lang="pl-PL" dirty="0" smtClean="0"/>
           </a:p>
         </p:txBody>
       </p:sp>
@@ -7549,7 +7524,6 @@
               <a:rPr lang="pl-PL" dirty="0" smtClean="0"/>
               <a:t>.</a:t>
             </a:r>
-            <a:endParaRPr lang="pl-PL" dirty="0" smtClean="0"/>
           </a:p>
         </p:txBody>
       </p:sp>
@@ -8941,7 +8915,6 @@
               <a:rPr lang="pl-PL" sz="2400" dirty="0" smtClean="0"/>
               <a:t> ma ewidentnie zbyt wiele odpowiedzialności.</a:t>
             </a:r>
-            <a:endParaRPr lang="pl-PL" sz="2400" dirty="0" smtClean="0"/>
           </a:p>
           <a:p>
             <a:endParaRPr lang="pl-PL" sz="2400" dirty="0"/>
@@ -9201,11 +9174,7 @@
           <a:p>
             <a:r>
               <a:rPr lang="pl-PL" sz="2400" dirty="0" smtClean="0"/>
-              <a:t>Aplikacja realizująca koncepcję rzeczywistości rozszerzonej, pozwalająca </a:t>
-            </a:r>
-            <a:r>
-              <a:rPr lang="pl-PL" sz="2400" dirty="0" smtClean="0"/>
-              <a:t>na wybranie i zapamiętanie tła, na którym wyświetlana będzie zdefiniowana przez użytkownika grafika.</a:t>
+              <a:t>Aplikacja realizująca koncepcję rzeczywistości rozszerzonej, pozwalająca na wybranie i zapamiętanie tła, na którym wyświetlana będzie zdefiniowana przez użytkownika grafika.</a:t>
             </a:r>
           </a:p>
           <a:p>
@@ -9223,11 +9192,7 @@
           <a:p>
             <a:r>
               <a:rPr lang="pl-PL" sz="2400" dirty="0" smtClean="0"/>
-              <a:t>Platforma: Android</a:t>
-            </a:r>
-            <a:r>
-              <a:rPr lang="pl-PL" sz="2400" dirty="0" smtClean="0"/>
-              <a:t>.</a:t>
+              <a:t>Platforma: Android.</a:t>
             </a:r>
           </a:p>
           <a:p>
@@ -9238,7 +9203,6 @@
               <a:rPr lang="pl-PL" sz="2400" dirty="0" smtClean="0"/>
               <a:t>Promotor: dr inż. Jakub Koperwas.</a:t>
             </a:r>
-            <a:endParaRPr lang="pl-PL" sz="2400" dirty="0" smtClean="0"/>
           </a:p>
         </p:txBody>
       </p:sp>
@@ -9459,11 +9423,7 @@
             </a:pPr>
             <a:r>
               <a:rPr lang="pl-PL" sz="2400" dirty="0" smtClean="0"/>
-              <a:t>Rozpoznanie </a:t>
-            </a:r>
-            <a:r>
-              <a:rPr lang="pl-PL" sz="2400" dirty="0" smtClean="0"/>
-              <a:t>tła</a:t>
+              <a:t>Rozpoznanie tła</a:t>
             </a:r>
           </a:p>
           <a:p>
@@ -9711,11 +9671,7 @@
             </a:r>
             <a:r>
               <a:rPr lang="pl-PL" dirty="0" smtClean="0"/>
-              <a:t>spomagany </a:t>
-            </a:r>
-            <a:r>
-              <a:rPr lang="pl-PL" dirty="0" smtClean="0"/>
-              <a:t>GPS,</a:t>
+              <a:t>spomagany GPS,</a:t>
             </a:r>
           </a:p>
           <a:p>
@@ -9726,11 +9682,7 @@
             </a:r>
             <a:r>
               <a:rPr lang="pl-PL" dirty="0" smtClean="0"/>
-              <a:t>dczyt </a:t>
-            </a:r>
-            <a:r>
-              <a:rPr lang="pl-PL" dirty="0" smtClean="0"/>
-              <a:t>pasywny.</a:t>
+              <a:t>dczyt pasywny.</a:t>
             </a:r>
           </a:p>
           <a:p>
@@ -10277,31 +10229,7 @@
                   </a:outerShdw>
                 </a:effectLst>
               </a:rPr>
-              <a:t>Pozycja telefonu: </a:t>
-            </a:r>
-            <a:r>
-              <a:rPr lang="pl-PL" sz="4000" dirty="0" smtClean="0">
-                <a:effectLst>
-                  <a:outerShdw blurRad="38100" dist="38100" dir="2700000" algn="tl">
-                    <a:srgbClr val="000000">
-                      <a:alpha val="43137"/>
-                    </a:srgbClr>
-                  </a:outerShdw>
-                </a:effectLst>
-              </a:rPr>
-              <a:t>wspomagany </a:t>
-            </a:r>
-            <a:r>
-              <a:rPr lang="pl-PL" sz="4000" dirty="0" smtClean="0">
-                <a:effectLst>
-                  <a:outerShdw blurRad="38100" dist="38100" dir="2700000" algn="tl">
-                    <a:srgbClr val="000000">
-                      <a:alpha val="43137"/>
-                    </a:srgbClr>
-                  </a:outerShdw>
-                </a:effectLst>
-              </a:rPr>
-              <a:t>GPS</a:t>
+              <a:t>Pozycja telefonu: wspomagany GPS</a:t>
             </a:r>
             <a:endParaRPr lang="pl-PL" sz="4000" dirty="0">
               <a:effectLst>
@@ -10387,11 +10315,7 @@
             <a:pPr lvl="1"/>
             <a:r>
               <a:rPr lang="pl-PL" dirty="0" smtClean="0"/>
-              <a:t>znaczne </a:t>
-            </a:r>
-            <a:r>
-              <a:rPr lang="pl-PL" dirty="0" smtClean="0"/>
-              <a:t>przyśpieszenie uzyskania </a:t>
+              <a:t>znaczne przyśpieszenie uzyskania </a:t>
             </a:r>
             <a:r>
               <a:rPr lang="pl-PL" dirty="0"/>
@@ -10430,21 +10354,8 @@
           <a:p>
             <a:r>
               <a:rPr lang="pl-PL" sz="2400" dirty="0" smtClean="0"/>
-              <a:t>Pobiera mniej </a:t>
-            </a:r>
-            <a:r>
-              <a:rPr lang="pl-PL" sz="2400" dirty="0" smtClean="0"/>
-              <a:t>energii </a:t>
-            </a:r>
-            <a:r>
-              <a:rPr lang="pl-PL" sz="2400" dirty="0" smtClean="0"/>
-              <a:t>niż „czysty” </a:t>
-            </a:r>
-            <a:r>
-              <a:rPr lang="pl-PL" sz="2400" dirty="0" smtClean="0"/>
-              <a:t>GPS.</a:t>
-            </a:r>
-            <a:endParaRPr lang="pl-PL" sz="2400" dirty="0" smtClean="0"/>
+              <a:t>Pobiera mniej energii niż „czysty” GPS.</a:t>
+            </a:r>
           </a:p>
         </p:txBody>
       </p:sp>

</xml_diff>